<commit_message>
end of spring 2016
</commit_message>
<xml_diff>
--- a/Exercises & Assignments/Design-navigation/IA-and-Navigation.pptx
+++ b/Exercises & Assignments/Design-navigation/IA-and-Navigation.pptx
@@ -139,6 +139,22 @@
       </a:defRPr>
     </a:lvl9pPr>
   </p:defaultTextStyle>
+  <p:extLst>
+    <p:ext uri="{EFAFB233-063F-42B5-8137-9DF3F51BA10A}">
+      <p15:sldGuideLst xmlns:p15="http://schemas.microsoft.com/office/powerpoint/2012/main">
+        <p15:guide id="1" orient="horz" pos="2160">
+          <p15:clr>
+            <a:srgbClr val="A4A3A4"/>
+          </p15:clr>
+        </p15:guide>
+        <p15:guide id="2" pos="2880">
+          <p15:clr>
+            <a:srgbClr val="A4A3A4"/>
+          </p15:clr>
+        </p15:guide>
+      </p15:sldGuideLst>
+    </p:ext>
+  </p:extLst>
 </p:presentation>
 </file>
 
@@ -224,7 +240,7 @@
           <a:p>
             <a:fld id="{9A3C2092-1572-2E4E-9B76-C9655F7C17D1}" type="datetimeFigureOut">
               <a:rPr lang="en-US" smtClean="0"/>
-              <a:t>2/17/14</a:t>
+              <a:t>2/14/16</a:t>
             </a:fld>
             <a:endParaRPr lang="en-US"/>
           </a:p>
@@ -1487,11 +1503,7 @@
             </a:r>
             <a:r>
               <a:rPr lang="en-US" baseline="0" dirty="0" smtClean="0"/>
-              <a:t> to wrap up, we learned lots of different best practices all in the name of helping your users to quickly use your site. Let them concentrate on your content and not be distracted or frustrated trying </a:t>
-            </a:r>
-            <a:r>
-              <a:rPr lang="en-US" baseline="0" smtClean="0"/>
-              <a:t>to learn.</a:t>
+              <a:t> to wrap up, we learned lots of different best practices all in the name of helping your users to quickly use your site. Let them concentrate on your content and not be distracted or frustrated trying to learn.</a:t>
             </a:r>
             <a:endParaRPr lang="en-US" dirty="0"/>
           </a:p>
@@ -2506,7 +2518,7 @@
           <a:p>
             <a:fld id="{57EE85F6-1ED5-45A6-94B2-EEF3BC0F9FE3}" type="datetimeFigureOut">
               <a:rPr lang="en-US" smtClean="0"/>
-              <a:t>2/17/14</a:t>
+              <a:t>2/14/16</a:t>
             </a:fld>
             <a:endParaRPr lang="en-US"/>
           </a:p>
@@ -2676,7 +2688,7 @@
           <a:p>
             <a:fld id="{57EE85F6-1ED5-45A6-94B2-EEF3BC0F9FE3}" type="datetimeFigureOut">
               <a:rPr lang="en-US" smtClean="0"/>
-              <a:t>2/17/14</a:t>
+              <a:t>2/14/16</a:t>
             </a:fld>
             <a:endParaRPr lang="en-US"/>
           </a:p>
@@ -2856,7 +2868,7 @@
           <a:p>
             <a:fld id="{57EE85F6-1ED5-45A6-94B2-EEF3BC0F9FE3}" type="datetimeFigureOut">
               <a:rPr lang="en-US" smtClean="0"/>
-              <a:t>2/17/14</a:t>
+              <a:t>2/14/16</a:t>
             </a:fld>
             <a:endParaRPr lang="en-US"/>
           </a:p>
@@ -3026,7 +3038,7 @@
           <a:p>
             <a:fld id="{57EE85F6-1ED5-45A6-94B2-EEF3BC0F9FE3}" type="datetimeFigureOut">
               <a:rPr lang="en-US" smtClean="0"/>
-              <a:t>2/17/14</a:t>
+              <a:t>2/14/16</a:t>
             </a:fld>
             <a:endParaRPr lang="en-US"/>
           </a:p>
@@ -3272,7 +3284,7 @@
           <a:p>
             <a:fld id="{57EE85F6-1ED5-45A6-94B2-EEF3BC0F9FE3}" type="datetimeFigureOut">
               <a:rPr lang="en-US" smtClean="0"/>
-              <a:t>2/17/14</a:t>
+              <a:t>2/14/16</a:t>
             </a:fld>
             <a:endParaRPr lang="en-US"/>
           </a:p>
@@ -3560,7 +3572,7 @@
           <a:p>
             <a:fld id="{57EE85F6-1ED5-45A6-94B2-EEF3BC0F9FE3}" type="datetimeFigureOut">
               <a:rPr lang="en-US" smtClean="0"/>
-              <a:t>2/17/14</a:t>
+              <a:t>2/14/16</a:t>
             </a:fld>
             <a:endParaRPr lang="en-US"/>
           </a:p>
@@ -3982,7 +3994,7 @@
           <a:p>
             <a:fld id="{57EE85F6-1ED5-45A6-94B2-EEF3BC0F9FE3}" type="datetimeFigureOut">
               <a:rPr lang="en-US" smtClean="0"/>
-              <a:t>2/17/14</a:t>
+              <a:t>2/14/16</a:t>
             </a:fld>
             <a:endParaRPr lang="en-US"/>
           </a:p>
@@ -4100,7 +4112,7 @@
           <a:p>
             <a:fld id="{57EE85F6-1ED5-45A6-94B2-EEF3BC0F9FE3}" type="datetimeFigureOut">
               <a:rPr lang="en-US" smtClean="0"/>
-              <a:t>2/17/14</a:t>
+              <a:t>2/14/16</a:t>
             </a:fld>
             <a:endParaRPr lang="en-US"/>
           </a:p>
@@ -4195,7 +4207,7 @@
           <a:p>
             <a:fld id="{57EE85F6-1ED5-45A6-94B2-EEF3BC0F9FE3}" type="datetimeFigureOut">
               <a:rPr lang="en-US" smtClean="0"/>
-              <a:t>2/17/14</a:t>
+              <a:t>2/14/16</a:t>
             </a:fld>
             <a:endParaRPr lang="en-US"/>
           </a:p>
@@ -4472,7 +4484,7 @@
           <a:p>
             <a:fld id="{57EE85F6-1ED5-45A6-94B2-EEF3BC0F9FE3}" type="datetimeFigureOut">
               <a:rPr lang="en-US" smtClean="0"/>
-              <a:t>2/17/14</a:t>
+              <a:t>2/14/16</a:t>
             </a:fld>
             <a:endParaRPr lang="en-US"/>
           </a:p>
@@ -4729,7 +4741,7 @@
           <a:p>
             <a:fld id="{57EE85F6-1ED5-45A6-94B2-EEF3BC0F9FE3}" type="datetimeFigureOut">
               <a:rPr lang="en-US" smtClean="0"/>
-              <a:t>2/17/14</a:t>
+              <a:t>2/14/16</a:t>
             </a:fld>
             <a:endParaRPr lang="en-US"/>
           </a:p>
@@ -4945,7 +4957,7 @@
           <a:p>
             <a:fld id="{57EE85F6-1ED5-45A6-94B2-EEF3BC0F9FE3}" type="datetimeFigureOut">
               <a:rPr lang="en-US" smtClean="0"/>
-              <a:t>2/17/14</a:t>
+              <a:t>2/14/16</a:t>
             </a:fld>
             <a:endParaRPr lang="en-US"/>
           </a:p>
@@ -6115,7 +6127,7 @@
                 <a:solidFill>
                   <a:srgbClr val="FFFFFF"/>
                 </a:solidFill>
-                <a:latin typeface="Amasis"/>
+                <a:latin typeface="+mj-lt"/>
               </a:rPr>
               <a:t>Lists and menus</a:t>
             </a:r>
@@ -6123,7 +6135,7 @@
               <a:solidFill>
                 <a:srgbClr val="FFFFFF"/>
               </a:solidFill>
-              <a:latin typeface="Amasis"/>
+              <a:latin typeface="+mj-lt"/>
             </a:endParaRPr>
           </a:p>
         </p:txBody>
@@ -6137,7 +6149,7 @@
         <p:spPr>
           <a:xfrm>
             <a:off x="457200" y="952500"/>
-            <a:ext cx="5762625" cy="1723543"/>
+            <a:ext cx="5762625" cy="1754320"/>
           </a:xfrm>
           <a:prstGeom prst="rect">
             <a:avLst/>
@@ -6162,7 +6174,7 @@
                 <a:solidFill>
                   <a:srgbClr val="FFFFFF"/>
                 </a:solidFill>
-                <a:latin typeface="Amasis"/>
+                <a:latin typeface="+mj-lt"/>
               </a:rPr>
               <a:t>Categories based on content</a:t>
             </a:r>
@@ -6180,7 +6192,7 @@
                 <a:solidFill>
                   <a:srgbClr val="FFFFFF"/>
                 </a:solidFill>
-                <a:latin typeface="Amasis"/>
+                <a:latin typeface="+mj-lt"/>
               </a:rPr>
               <a:t>Manageable # of items</a:t>
             </a:r>
@@ -6198,7 +6210,7 @@
                 <a:solidFill>
                   <a:srgbClr val="FFFFFF"/>
                 </a:solidFill>
-                <a:latin typeface="Amasis"/>
+                <a:latin typeface="+mj-lt"/>
               </a:rPr>
               <a:t>Clear grouping</a:t>
             </a:r>
@@ -6206,7 +6218,7 @@
               <a:solidFill>
                 <a:srgbClr val="FFFFFF"/>
               </a:solidFill>
-              <a:latin typeface="Amasis"/>
+              <a:latin typeface="+mj-lt"/>
             </a:endParaRPr>
           </a:p>
         </p:txBody>
@@ -6329,8 +6341,8 @@
           <a:lstStyle/>
           <a:p>
             <a:r>
-              <a:rPr lang="en-US" dirty="0" smtClean="0"/>
-              <a:t>The Line up</a:t>
+              <a:rPr lang="en-US" smtClean="0"/>
+              <a:t>Comparisons</a:t>
             </a:r>
             <a:endParaRPr lang="en-US" dirty="0"/>
           </a:p>
@@ -6666,7 +6678,7 @@
                 <a:solidFill>
                   <a:srgbClr val="FFFFFF"/>
                 </a:solidFill>
-                <a:latin typeface="Amasis"/>
+                <a:latin typeface="+mj-lt"/>
               </a:rPr>
               <a:t>Summary</a:t>
             </a:r>
@@ -6674,7 +6686,7 @@
               <a:solidFill>
                 <a:srgbClr val="FFFFFF"/>
               </a:solidFill>
-              <a:latin typeface="Amasis"/>
+              <a:latin typeface="+mj-lt"/>
             </a:endParaRPr>
           </a:p>
         </p:txBody>
@@ -6706,7 +6718,7 @@
                 <a:solidFill>
                   <a:srgbClr val="FFC30E"/>
                 </a:solidFill>
-                <a:latin typeface="Amasis"/>
+                <a:latin typeface="+mj-lt"/>
               </a:rPr>
               <a:t>Standards</a:t>
             </a:r>
@@ -6718,7 +6730,7 @@
                 <a:solidFill>
                   <a:srgbClr val="FFFFFF"/>
                 </a:solidFill>
-                <a:latin typeface="Amasis"/>
+                <a:latin typeface="+mj-lt"/>
               </a:rPr>
               <a:t>Why?</a:t>
             </a:r>
@@ -6726,7 +6738,7 @@
               <a:solidFill>
                 <a:srgbClr val="FFFFFF"/>
               </a:solidFill>
-              <a:latin typeface="Amasis"/>
+              <a:latin typeface="+mj-lt"/>
             </a:endParaRPr>
           </a:p>
           <a:p>
@@ -6734,7 +6746,7 @@
               <a:solidFill>
                 <a:srgbClr val="FFFFFF"/>
               </a:solidFill>
-              <a:latin typeface="Amasis"/>
+              <a:latin typeface="+mj-lt"/>
             </a:endParaRPr>
           </a:p>
           <a:p>
@@ -6743,7 +6755,7 @@
                 <a:solidFill>
                   <a:srgbClr val="FFC30E"/>
                 </a:solidFill>
-                <a:latin typeface="Amasis"/>
+                <a:latin typeface="+mj-lt"/>
               </a:rPr>
               <a:t>Information </a:t>
             </a:r>
@@ -6752,7 +6764,7 @@
                 <a:solidFill>
                   <a:srgbClr val="FFC30E"/>
                 </a:solidFill>
-                <a:latin typeface="Amasis"/>
+                <a:latin typeface="+mj-lt"/>
               </a:rPr>
               <a:t>Architecture </a:t>
             </a:r>
@@ -6760,7 +6772,7 @@
               <a:solidFill>
                 <a:srgbClr val="FFC30E"/>
               </a:solidFill>
-              <a:latin typeface="Amasis"/>
+              <a:latin typeface="+mj-lt"/>
             </a:endParaRPr>
           </a:p>
           <a:p>
@@ -6770,7 +6782,7 @@
                 <a:solidFill>
                   <a:srgbClr val="FFFFFF"/>
                 </a:solidFill>
-                <a:latin typeface="Amasis"/>
+                <a:latin typeface="+mj-lt"/>
               </a:rPr>
               <a:t>Visual language</a:t>
             </a:r>
@@ -6782,7 +6794,7 @@
                 <a:solidFill>
                   <a:srgbClr val="FFFFFF"/>
                 </a:solidFill>
-                <a:latin typeface="Amasis"/>
+                <a:latin typeface="+mj-lt"/>
               </a:rPr>
               <a:t>Formatting</a:t>
             </a:r>
@@ -6792,7 +6804,7 @@
               <a:solidFill>
                 <a:srgbClr val="FFFFFF"/>
               </a:solidFill>
-              <a:latin typeface="Amasis"/>
+              <a:latin typeface="+mj-lt"/>
             </a:endParaRPr>
           </a:p>
           <a:p>
@@ -6801,7 +6813,7 @@
                 <a:solidFill>
                   <a:srgbClr val="FFC30E"/>
                 </a:solidFill>
-                <a:latin typeface="Amasis"/>
+                <a:latin typeface="+mj-lt"/>
               </a:rPr>
               <a:t>Navigation</a:t>
             </a:r>
@@ -6809,7 +6821,7 @@
               <a:solidFill>
                 <a:srgbClr val="FFC30E"/>
               </a:solidFill>
-              <a:latin typeface="Amasis"/>
+              <a:latin typeface="+mj-lt"/>
             </a:endParaRPr>
           </a:p>
           <a:p>
@@ -6819,7 +6831,7 @@
                 <a:solidFill>
                   <a:srgbClr val="FFFFFF"/>
                 </a:solidFill>
-                <a:latin typeface="Amasis"/>
+                <a:latin typeface="+mj-lt"/>
               </a:rPr>
               <a:t>Where </a:t>
             </a:r>
@@ -6828,7 +6840,7 @@
                 <a:solidFill>
                   <a:srgbClr val="FFFFFF"/>
                 </a:solidFill>
-                <a:latin typeface="Amasis"/>
+                <a:latin typeface="+mj-lt"/>
               </a:rPr>
               <a:t>are you now?</a:t>
             </a:r>
@@ -6840,7 +6852,7 @@
                 <a:solidFill>
                   <a:srgbClr val="FFFFFF"/>
                 </a:solidFill>
-                <a:latin typeface="Amasis"/>
+                <a:latin typeface="+mj-lt"/>
               </a:rPr>
               <a:t>How </a:t>
             </a:r>
@@ -6849,7 +6861,7 @@
                 <a:solidFill>
                   <a:srgbClr val="FFFFFF"/>
                 </a:solidFill>
-                <a:latin typeface="Amasis"/>
+                <a:latin typeface="+mj-lt"/>
               </a:rPr>
               <a:t>did you get here?</a:t>
             </a:r>
@@ -6861,7 +6873,7 @@
                 <a:solidFill>
                   <a:srgbClr val="FFFFFF"/>
                 </a:solidFill>
-                <a:latin typeface="Amasis"/>
+                <a:latin typeface="+mj-lt"/>
               </a:rPr>
               <a:t>Where </a:t>
             </a:r>
@@ -6870,7 +6882,7 @@
                 <a:solidFill>
                   <a:srgbClr val="FFFFFF"/>
                 </a:solidFill>
-                <a:latin typeface="Amasis"/>
+                <a:latin typeface="+mj-lt"/>
               </a:rPr>
               <a:t>are you going</a:t>
             </a:r>
@@ -6879,7 +6891,7 @@
                 <a:solidFill>
                   <a:srgbClr val="FFFFFF"/>
                 </a:solidFill>
-                <a:latin typeface="Amasis"/>
+                <a:latin typeface="+mj-lt"/>
               </a:rPr>
               <a:t>?</a:t>
             </a:r>
@@ -6887,7 +6899,7 @@
               <a:solidFill>
                 <a:srgbClr val="FFFFFF"/>
               </a:solidFill>
-              <a:latin typeface="Amasis"/>
+              <a:latin typeface="+mj-lt"/>
             </a:endParaRPr>
           </a:p>
         </p:txBody>
@@ -6930,8 +6942,8 @@
         </p:nvSpPr>
         <p:spPr>
           <a:xfrm>
-            <a:off x="381002" y="107623"/>
-            <a:ext cx="6810375" cy="1118255"/>
+            <a:off x="381002" y="366671"/>
+            <a:ext cx="6810375" cy="600158"/>
           </a:xfrm>
           <a:prstGeom prst="rect">
             <a:avLst/>
@@ -6946,13 +6958,22 @@
           <a:p>
             <a:pPr algn="ctr"/>
             <a:r>
+              <a:rPr lang="en-US" sz="3300" b="1" dirty="0" smtClean="0">
+                <a:solidFill>
+                  <a:srgbClr val="FFFFFF"/>
+                </a:solidFill>
+                <a:latin typeface="+mj-lt"/>
+              </a:rPr>
+              <a:t>Give directions to </a:t>
+            </a:r>
+            <a:r>
               <a:rPr lang="en-US" sz="3300" b="1" dirty="0">
                 <a:solidFill>
                   <a:srgbClr val="FFFFFF"/>
                 </a:solidFill>
-                <a:latin typeface="Amasis"/>
+                <a:latin typeface="+mj-lt"/>
               </a:rPr>
-              <a:t>Navigation gives orientation clues to users</a:t>
+              <a:t>users</a:t>
             </a:r>
           </a:p>
         </p:txBody>
@@ -6966,7 +6987,7 @@
         <p:spPr>
           <a:xfrm>
             <a:off x="295277" y="1276350"/>
-            <a:ext cx="6810375" cy="2267281"/>
+            <a:ext cx="6810375" cy="2308318"/>
           </a:xfrm>
           <a:prstGeom prst="rect">
             <a:avLst/>
@@ -6991,7 +7012,7 @@
                 <a:solidFill>
                   <a:srgbClr val="FFFFFF"/>
                 </a:solidFill>
-                <a:latin typeface="Amasis"/>
+                <a:latin typeface="+mj-lt"/>
               </a:rPr>
               <a:t>Where are you now?</a:t>
             </a:r>
@@ -6999,7 +7020,7 @@
               <a:solidFill>
                 <a:srgbClr val="FFFFFF"/>
               </a:solidFill>
-              <a:latin typeface="Amasis"/>
+              <a:latin typeface="+mj-lt"/>
             </a:endParaRPr>
           </a:p>
           <a:p>
@@ -7015,7 +7036,7 @@
                 <a:solidFill>
                   <a:srgbClr val="FFFFFF"/>
                 </a:solidFill>
-                <a:latin typeface="Amasis"/>
+                <a:latin typeface="+mj-lt"/>
               </a:rPr>
               <a:t>How did you get here?</a:t>
             </a:r>
@@ -7023,7 +7044,7 @@
               <a:solidFill>
                 <a:srgbClr val="FFFFFF"/>
               </a:solidFill>
-              <a:latin typeface="Amasis"/>
+              <a:latin typeface="+mj-lt"/>
             </a:endParaRPr>
           </a:p>
           <a:p>
@@ -7039,7 +7060,7 @@
                 <a:solidFill>
                   <a:srgbClr val="FFFFFF"/>
                 </a:solidFill>
-                <a:latin typeface="Amasis"/>
+                <a:latin typeface="+mj-lt"/>
               </a:rPr>
               <a:t>Where are you going now?</a:t>
             </a:r>
@@ -7047,7 +7068,7 @@
               <a:solidFill>
                 <a:srgbClr val="FFFFFF"/>
               </a:solidFill>
-              <a:latin typeface="Amasis"/>
+              <a:latin typeface="+mj-lt"/>
             </a:endParaRPr>
           </a:p>
         </p:txBody>
@@ -8729,7 +8750,7 @@
       </p:grpSpPr>
       <p:sp>
         <p:nvSpPr>
-          <p:cNvPr id="322" name="Title"/>
+          <p:cNvPr id="6" name="Title"/>
           <p:cNvSpPr txBox="1"/>
           <p:nvPr/>
         </p:nvSpPr>
@@ -8750,26 +8771,32 @@
           <a:lstStyle/>
           <a:p>
             <a:r>
-              <a:rPr lang="en-US" sz="3700" b="1" dirty="0">
+              <a:rPr lang="en-US" sz="3700" b="1" dirty="0" smtClean="0">
                 <a:solidFill>
                   <a:srgbClr val="FFFFFF"/>
                 </a:solidFill>
-                <a:latin typeface="Amasis"/>
+                <a:latin typeface="+mj-lt"/>
               </a:rPr>
-              <a:t>Review:</a:t>
-            </a:r>
-          </a:p>
-        </p:txBody>
-      </p:sp>
-      <p:sp>
-        <p:nvSpPr>
-          <p:cNvPr id="323" name="Body"/>
+              <a:t>Review</a:t>
+            </a:r>
+            <a:endParaRPr lang="en-US" sz="3700" b="1" dirty="0">
+              <a:solidFill>
+                <a:srgbClr val="FFFFFF"/>
+              </a:solidFill>
+              <a:latin typeface="+mj-lt"/>
+            </a:endParaRPr>
+          </a:p>
+        </p:txBody>
+      </p:sp>
+      <p:sp>
+        <p:nvSpPr>
+          <p:cNvPr id="7" name="Body"/>
           <p:cNvSpPr txBox="1"/>
           <p:nvPr/>
         </p:nvSpPr>
         <p:spPr>
           <a:xfrm>
-            <a:off x="381002" y="988523"/>
+            <a:off x="381002" y="1140923"/>
             <a:ext cx="6810375" cy="4154977"/>
           </a:xfrm>
           <a:prstGeom prst="rect">
@@ -8788,7 +8815,7 @@
                 <a:solidFill>
                   <a:srgbClr val="FFC30E"/>
                 </a:solidFill>
-                <a:latin typeface="Amasis"/>
+                <a:latin typeface="+mj-lt"/>
               </a:rPr>
               <a:t>Standards</a:t>
             </a:r>
@@ -8800,40 +8827,155 @@
                 <a:solidFill>
                   <a:srgbClr val="FFFFFF"/>
                 </a:solidFill>
-                <a:latin typeface="Amasis"/>
+                <a:latin typeface="+mj-lt"/>
               </a:rPr>
-              <a:t>Why?</a:t>
+              <a:t>Why</a:t>
+            </a:r>
+            <a:r>
+              <a:rPr lang="en-US" sz="2400" dirty="0" smtClean="0">
+                <a:solidFill>
+                  <a:srgbClr val="FFFFFF"/>
+                </a:solidFill>
+                <a:latin typeface="+mj-lt"/>
+              </a:rPr>
+              <a:t>? – </a:t>
+            </a:r>
+            <a:r>
+              <a:rPr lang="en-US" sz="2400" i="1" dirty="0" smtClean="0">
+                <a:solidFill>
+                  <a:srgbClr val="FFFFFF"/>
+                </a:solidFill>
+                <a:latin typeface="+mj-lt"/>
+              </a:rPr>
+              <a:t>Common knowledge</a:t>
+            </a:r>
+            <a:endParaRPr lang="en-US" sz="2400" i="1" dirty="0">
+              <a:solidFill>
+                <a:srgbClr val="FFFFFF"/>
+              </a:solidFill>
+              <a:latin typeface="+mj-lt"/>
+            </a:endParaRPr>
+          </a:p>
+          <a:p>
+            <a:endParaRPr lang="en-US" sz="2400" b="1" dirty="0" smtClean="0">
+              <a:solidFill>
+                <a:srgbClr val="FFFFFF"/>
+              </a:solidFill>
+              <a:latin typeface="+mj-lt"/>
+            </a:endParaRPr>
+          </a:p>
+          <a:p>
+            <a:r>
+              <a:rPr lang="en-US" sz="2400" b="1" dirty="0" smtClean="0">
+                <a:solidFill>
+                  <a:srgbClr val="FFC30E"/>
+                </a:solidFill>
+                <a:latin typeface="+mj-lt"/>
+              </a:rPr>
+              <a:t>Information </a:t>
+            </a:r>
+            <a:r>
+              <a:rPr lang="en-US" sz="2400" b="1" dirty="0">
+                <a:solidFill>
+                  <a:srgbClr val="FFC30E"/>
+                </a:solidFill>
+                <a:latin typeface="+mj-lt"/>
+              </a:rPr>
+              <a:t>Architecture </a:t>
+            </a:r>
+            <a:endParaRPr lang="en-US" sz="2400" b="1" dirty="0" smtClean="0">
+              <a:solidFill>
+                <a:srgbClr val="FFC30E"/>
+              </a:solidFill>
+              <a:latin typeface="+mj-lt"/>
+            </a:endParaRPr>
+          </a:p>
+          <a:p>
+            <a:pPr lvl="1"/>
+            <a:r>
+              <a:rPr lang="en-US" sz="2400" dirty="0" smtClean="0">
+                <a:solidFill>
+                  <a:srgbClr val="FFFFFF"/>
+                </a:solidFill>
+                <a:latin typeface="+mj-lt"/>
+              </a:rPr>
+              <a:t>Visual </a:t>
+            </a:r>
+            <a:r>
+              <a:rPr lang="en-US" sz="2400" dirty="0" smtClean="0">
+                <a:solidFill>
+                  <a:srgbClr val="FFFFFF"/>
+                </a:solidFill>
+                <a:latin typeface="+mj-lt"/>
+              </a:rPr>
+              <a:t>language – Hover states, icons</a:t>
+            </a:r>
+            <a:endParaRPr lang="en-US" sz="2400" dirty="0" smtClean="0">
+              <a:solidFill>
+                <a:srgbClr val="FFFFFF"/>
+              </a:solidFill>
+              <a:latin typeface="+mj-lt"/>
+            </a:endParaRPr>
+          </a:p>
+          <a:p>
+            <a:pPr lvl="1"/>
+            <a:r>
+              <a:rPr lang="en-US" sz="2400" dirty="0" smtClean="0">
+                <a:solidFill>
+                  <a:srgbClr val="FFFFFF"/>
+                </a:solidFill>
+                <a:latin typeface="+mj-lt"/>
+              </a:rPr>
+              <a:t>Formatting – lists &amp; menus </a:t>
+            </a:r>
+            <a:endParaRPr lang="en-US" sz="2400" dirty="0" smtClean="0">
+              <a:solidFill>
+                <a:srgbClr val="FFFFFF"/>
+              </a:solidFill>
+              <a:latin typeface="+mj-lt"/>
+            </a:endParaRPr>
+          </a:p>
+          <a:p>
+            <a:endParaRPr lang="en-US" sz="2400" b="1" dirty="0" smtClean="0">
+              <a:solidFill>
+                <a:srgbClr val="FFFFFF"/>
+              </a:solidFill>
+              <a:latin typeface="+mj-lt"/>
+            </a:endParaRPr>
+          </a:p>
+          <a:p>
+            <a:r>
+              <a:rPr lang="en-US" sz="2400" b="1" dirty="0" smtClean="0">
+                <a:solidFill>
+                  <a:srgbClr val="FFC30E"/>
+                </a:solidFill>
+                <a:latin typeface="+mj-lt"/>
+              </a:rPr>
+              <a:t>Navigation</a:t>
+            </a:r>
+            <a:endParaRPr lang="en-US" sz="2400" b="1" dirty="0">
+              <a:solidFill>
+                <a:srgbClr val="FFC30E"/>
+              </a:solidFill>
+              <a:latin typeface="+mj-lt"/>
+            </a:endParaRPr>
+          </a:p>
+          <a:p>
+            <a:pPr lvl="1"/>
+            <a:r>
+              <a:rPr lang="en-US" sz="2400" dirty="0" smtClean="0">
+                <a:solidFill>
+                  <a:srgbClr val="FFFFFF"/>
+                </a:solidFill>
+                <a:latin typeface="+mj-lt"/>
+              </a:rPr>
+              <a:t>Now – Logo &amp; title, current states</a:t>
             </a:r>
             <a:endParaRPr lang="en-US" sz="2400" dirty="0">
               <a:solidFill>
                 <a:srgbClr val="FFFFFF"/>
               </a:solidFill>
-              <a:latin typeface="Amasis"/>
-            </a:endParaRPr>
-          </a:p>
-          <a:p>
-            <a:endParaRPr lang="en-US" sz="2400" b="1" dirty="0" smtClean="0">
-              <a:solidFill>
-                <a:srgbClr val="FFFFFF"/>
-              </a:solidFill>
-              <a:latin typeface="Amasis"/>
-            </a:endParaRPr>
-          </a:p>
-          <a:p>
-            <a:r>
-              <a:rPr lang="en-US" sz="2400" b="1" dirty="0" smtClean="0">
-                <a:solidFill>
-                  <a:srgbClr val="FFC30E"/>
-                </a:solidFill>
-                <a:latin typeface="Amasis"/>
-              </a:rPr>
-              <a:t>Information Architecture</a:t>
-            </a:r>
-            <a:endParaRPr lang="en-US" sz="2400" b="1" dirty="0" smtClean="0">
-              <a:solidFill>
-                <a:srgbClr val="FFFFFF"/>
-              </a:solidFill>
-              <a:latin typeface="Amasis"/>
+              <a:latin typeface="+mj-lt"/>
             </a:endParaRPr>
           </a:p>
           <a:p>
@@ -8843,46 +8985,24 @@
                 <a:solidFill>
                   <a:srgbClr val="FFFFFF"/>
                 </a:solidFill>
-                <a:latin typeface="Amasis"/>
+                <a:latin typeface="+mj-lt"/>
               </a:rPr>
-              <a:t>Visual language</a:t>
-            </a:r>
-          </a:p>
-          <a:p>
-            <a:pPr lvl="1"/>
+              <a:t>Past </a:t>
+            </a:r>
             <a:r>
               <a:rPr lang="en-US" sz="2400" dirty="0" smtClean="0">
                 <a:solidFill>
                   <a:srgbClr val="FFFFFF"/>
                 </a:solidFill>
-                <a:latin typeface="Amasis"/>
+                <a:latin typeface="+mj-lt"/>
               </a:rPr>
-              <a:t>Formatting</a:t>
-            </a:r>
-          </a:p>
-          <a:p>
-            <a:endParaRPr lang="en-US" sz="2400" b="1" dirty="0" smtClean="0">
+              <a:t>– breadcrumbs, history</a:t>
+            </a:r>
+            <a:endParaRPr lang="en-US" sz="2400" dirty="0">
               <a:solidFill>
                 <a:srgbClr val="FFFFFF"/>
               </a:solidFill>
-              <a:latin typeface="Amasis"/>
-            </a:endParaRPr>
-          </a:p>
-          <a:p>
-            <a:r>
-              <a:rPr lang="en-US" sz="2400" b="1" dirty="0" smtClean="0">
-                <a:solidFill>
-                  <a:srgbClr val="FFC30E"/>
-                </a:solidFill>
-                <a:latin typeface="Amasis"/>
-              </a:rPr>
-              <a:t>Navigation</a:t>
-            </a:r>
-            <a:endParaRPr lang="en-US" sz="2400" b="1" dirty="0">
-              <a:solidFill>
-                <a:srgbClr val="FFC30E"/>
-              </a:solidFill>
-              <a:latin typeface="Amasis"/>
+              <a:latin typeface="+mj-lt"/>
             </a:endParaRPr>
           </a:p>
           <a:p>
@@ -8892,75 +9012,15 @@
                 <a:solidFill>
                   <a:srgbClr val="FFFFFF"/>
                 </a:solidFill>
-                <a:latin typeface="Amasis"/>
+                <a:latin typeface="+mj-lt"/>
               </a:rPr>
-              <a:t>Where </a:t>
-            </a:r>
-            <a:r>
-              <a:rPr lang="en-US" sz="2400" dirty="0">
-                <a:solidFill>
-                  <a:srgbClr val="FFFFFF"/>
-                </a:solidFill>
-                <a:latin typeface="Amasis"/>
-              </a:rPr>
-              <a:t>are you now?</a:t>
-            </a:r>
-          </a:p>
-          <a:p>
-            <a:pPr lvl="1"/>
-            <a:r>
-              <a:rPr lang="en-US" sz="2400" dirty="0" smtClean="0">
-                <a:solidFill>
-                  <a:srgbClr val="FFFFFF"/>
-                </a:solidFill>
-                <a:latin typeface="Amasis"/>
-              </a:rPr>
-              <a:t>How </a:t>
-            </a:r>
-            <a:r>
-              <a:rPr lang="en-US" sz="2400" dirty="0">
-                <a:solidFill>
-                  <a:srgbClr val="FFFFFF"/>
-                </a:solidFill>
-                <a:latin typeface="Amasis"/>
-              </a:rPr>
-              <a:t>did you get here?</a:t>
-            </a:r>
-          </a:p>
-          <a:p>
-            <a:pPr lvl="1"/>
-            <a:r>
-              <a:rPr lang="en-US" sz="2400" dirty="0" smtClean="0">
-                <a:solidFill>
-                  <a:srgbClr val="FFFFFF"/>
-                </a:solidFill>
-                <a:latin typeface="Amasis"/>
-              </a:rPr>
-              <a:t>Where </a:t>
-            </a:r>
-            <a:r>
-              <a:rPr lang="en-US" sz="2400" dirty="0">
-                <a:solidFill>
-                  <a:srgbClr val="FFFFFF"/>
-                </a:solidFill>
-                <a:latin typeface="Amasis"/>
-              </a:rPr>
-              <a:t>are you going</a:t>
-            </a:r>
-            <a:r>
-              <a:rPr lang="en-US" sz="2400" dirty="0" smtClean="0">
-                <a:solidFill>
-                  <a:srgbClr val="FFFFFF"/>
-                </a:solidFill>
-                <a:latin typeface="Amasis"/>
-              </a:rPr>
-              <a:t>?</a:t>
+              <a:t>Future - Link text</a:t>
             </a:r>
             <a:endParaRPr lang="en-US" sz="2400" dirty="0">
               <a:solidFill>
                 <a:srgbClr val="FFFFFF"/>
               </a:solidFill>
-              <a:latin typeface="Amasis"/>
+              <a:latin typeface="+mj-lt"/>
             </a:endParaRPr>
           </a:p>
         </p:txBody>

</xml_diff>